<commit_message>
created function to replace special characters
</commit_message>
<xml_diff>
--- a/files/ppt_presentations/ppt_demo.pptx
+++ b/files/ppt_presentations/ppt_demo.pptx
@@ -6,7 +6,7 @@
     <p:sldMasterId id="2147483699" r:id="rId11"/>
   </p:sldMasterIdLst>
   <p:notesMasterIdLst>
-    <p:notesMasterId r:id="rId28"/>
+    <p:notesMasterId r:id="rId29"/>
   </p:notesMasterIdLst>
   <p:sldIdLst>
     <p:sldId id="257" r:id="rId12"/>
@@ -22,9 +22,10 @@
     <p:sldId id="494" r:id="rId22"/>
     <p:sldId id="495" r:id="rId23"/>
     <p:sldId id="502" r:id="rId24"/>
-    <p:sldId id="339" r:id="rId25"/>
-    <p:sldId id="380" r:id="rId26"/>
-    <p:sldId id="330" r:id="rId27"/>
+    <p:sldId id="503" r:id="rId25"/>
+    <p:sldId id="339" r:id="rId26"/>
+    <p:sldId id="380" r:id="rId27"/>
+    <p:sldId id="330" r:id="rId28"/>
   </p:sldIdLst>
   <p:sldSz cx="12192000" cy="6858000"/>
   <p:notesSz cx="6858000" cy="9144000"/>
@@ -141,6 +142,7 @@
             <p14:sldId id="494"/>
             <p14:sldId id="495"/>
             <p14:sldId id="502"/>
+            <p14:sldId id="503"/>
           </p14:sldIdLst>
         </p14:section>
         <p14:section name="Context" id="{065BED4C-6380-4DDB-97EA-F07556E2D9B4}">
@@ -248,7 +250,6 @@
           </a:p>
         </c:rich>
       </c:tx>
-      <c:layout/>
       <c:overlay val="0"/>
       <c:spPr>
         <a:noFill/>
@@ -881,7 +882,6 @@
         <c:idx val="9"/>
         <c:delete val="1"/>
       </c:legendEntry>
-      <c:layout/>
       <c:overlay val="0"/>
       <c:spPr>
         <a:noFill/>
@@ -4839,7 +4839,7 @@
           <a:p>
             <a:fld id="{C53FC889-3B05-4F6A-9AB7-C2521E883D0A}" type="datetimeFigureOut">
               <a:rPr lang="en-GB" smtClean="0"/>
-              <a:t>16/04/2020</a:t>
+              <a:t>18/05/2020</a:t>
             </a:fld>
             <a:endParaRPr lang="en-GB" dirty="0"/>
           </a:p>
@@ -5621,7 +5621,7 @@
           <a:p>
             <a:fld id="{253E99D3-575E-4B33-AEE3-580024E0F63F}" type="slidenum">
               <a:rPr lang="en-GB" smtClean="0"/>
-              <a:t>14</a:t>
+              <a:t>15</a:t>
             </a:fld>
             <a:endParaRPr lang="en-GB"/>
           </a:p>
@@ -5705,7 +5705,7 @@
           <a:p>
             <a:fld id="{253E99D3-575E-4B33-AEE3-580024E0F63F}" type="slidenum">
               <a:rPr lang="en-GB" smtClean="0"/>
-              <a:t>15</a:t>
+              <a:t>16</a:t>
             </a:fld>
             <a:endParaRPr lang="en-GB"/>
           </a:p>
@@ -5875,7 +5875,7 @@
           <a:p>
             <a:fld id="{9EFE7453-B082-4124-B5AE-B87EE023CDB1}" type="datetime1">
               <a:rPr lang="sv-SE" smtClean="0"/>
-              <a:t>2020-04-16</a:t>
+              <a:t>2020-05-18</a:t>
             </a:fld>
             <a:endParaRPr lang="en-GB" dirty="0"/>
           </a:p>
@@ -6121,7 +6121,7 @@
                   <a:prstClr val="black"/>
                 </a:solidFill>
               </a:rPr>
-              <a:t>2020-04-16</a:t>
+              <a:t>2020-05-18</a:t>
             </a:fld>
             <a:endParaRPr lang="en-GB" dirty="0">
               <a:solidFill>
@@ -6489,7 +6489,7 @@
                   <a:prstClr val="black"/>
                 </a:solidFill>
               </a:rPr>
-              <a:t>2020-04-16</a:t>
+              <a:t>2020-05-18</a:t>
             </a:fld>
             <a:endParaRPr lang="en-GB" dirty="0">
               <a:solidFill>
@@ -6772,7 +6772,7 @@
                   <a:prstClr val="black"/>
                 </a:solidFill>
               </a:rPr>
-              <a:t>2020-04-16</a:t>
+              <a:t>2020-05-18</a:t>
             </a:fld>
             <a:endParaRPr lang="en-GB" dirty="0">
               <a:solidFill>
@@ -7098,7 +7098,7 @@
                   <a:prstClr val="black"/>
                 </a:solidFill>
               </a:rPr>
-              <a:t>2020-04-16</a:t>
+              <a:t>2020-05-18</a:t>
             </a:fld>
             <a:endParaRPr lang="en-GB" dirty="0">
               <a:solidFill>
@@ -7369,7 +7369,7 @@
                   <a:prstClr val="black"/>
                 </a:solidFill>
               </a:rPr>
-              <a:t>2020-04-16</a:t>
+              <a:t>2020-05-18</a:t>
             </a:fld>
             <a:endParaRPr lang="en-GB" dirty="0">
               <a:solidFill>
@@ -7555,7 +7555,7 @@
                   <a:prstClr val="black"/>
                 </a:solidFill>
               </a:rPr>
-              <a:t>2020-04-16</a:t>
+              <a:t>2020-05-18</a:t>
             </a:fld>
             <a:endParaRPr lang="en-GB" dirty="0">
               <a:solidFill>
@@ -9836,7 +9836,7 @@
                   <a:prstClr val="black"/>
                 </a:solidFill>
               </a:rPr>
-              <a:t>2020-04-16</a:t>
+              <a:t>2020-05-18</a:t>
             </a:fld>
             <a:endParaRPr lang="en-GB" dirty="0">
               <a:solidFill>
@@ -10585,7 +10585,7 @@
             </a:pPr>
             <a:fld id="{D1537DF4-BE14-43E4-9A37-FFE4AFD6E832}" type="datetime1">
               <a:rPr lang="sv-SE" smtClean="0"/>
-              <a:t>2020-04-16</a:t>
+              <a:t>2020-05-18</a:t>
             </a:fld>
             <a:endParaRPr lang="sv-SE"/>
           </a:p>
@@ -10809,7 +10809,7 @@
           <a:p>
             <a:fld id="{80F358A9-049B-44CD-82AF-D1F2A38D371E}" type="datetime1">
               <a:rPr lang="sv-SE" smtClean="0"/>
-              <a:t>2020-04-16</a:t>
+              <a:t>2020-05-18</a:t>
             </a:fld>
             <a:endParaRPr lang="sv-SE"/>
           </a:p>
@@ -10978,7 +10978,7 @@
           <a:p>
             <a:fld id="{0EFFECE1-EFDB-4ED4-A92B-EC11843FA500}" type="datetime1">
               <a:rPr lang="sv-SE" smtClean="0"/>
-              <a:t>2020-04-16</a:t>
+              <a:t>2020-05-18</a:t>
             </a:fld>
             <a:endParaRPr lang="en-US" dirty="0"/>
           </a:p>
@@ -11229,7 +11229,7 @@
           <a:p>
             <a:fld id="{3E8B38C6-DEFB-43C3-9001-532227D2C227}" type="datetime1">
               <a:rPr lang="sv-SE" smtClean="0"/>
-              <a:t>2020-04-16</a:t>
+              <a:t>2020-05-18</a:t>
             </a:fld>
             <a:endParaRPr lang="sv-SE"/>
           </a:p>
@@ -11479,7 +11479,7 @@
           <a:p>
             <a:fld id="{4D6B0352-3FAF-4997-A408-54821387E8C2}" type="datetime1">
               <a:rPr lang="sv-SE" smtClean="0"/>
-              <a:t>2020-04-16</a:t>
+              <a:t>2020-05-18</a:t>
             </a:fld>
             <a:endParaRPr lang="sv-SE"/>
           </a:p>
@@ -11715,7 +11715,7 @@
           <a:p>
             <a:fld id="{716563E9-3DC5-4469-9964-FF98F1612663}" type="datetime1">
               <a:rPr lang="sv-SE" smtClean="0"/>
-              <a:t>2020-04-16</a:t>
+              <a:t>2020-05-18</a:t>
             </a:fld>
             <a:endParaRPr lang="sv-SE"/>
           </a:p>
@@ -12086,7 +12086,7 @@
           <a:p>
             <a:fld id="{1CBF595A-354E-4185-8569-5903072BC314}" type="datetime1">
               <a:rPr lang="sv-SE" smtClean="0"/>
-              <a:t>2020-04-16</a:t>
+              <a:t>2020-05-18</a:t>
             </a:fld>
             <a:endParaRPr lang="sv-SE"/>
           </a:p>
@@ -12208,7 +12208,7 @@
           <a:p>
             <a:fld id="{BFCB468F-8F0C-4472-9C74-13DD7D928865}" type="datetime1">
               <a:rPr lang="sv-SE" smtClean="0"/>
-              <a:t>2020-04-16</a:t>
+              <a:t>2020-05-18</a:t>
             </a:fld>
             <a:endParaRPr lang="sv-SE"/>
           </a:p>
@@ -12307,7 +12307,7 @@
           <a:p>
             <a:fld id="{BC504758-5BE1-4D18-AD7B-70303133ACF8}" type="datetime1">
               <a:rPr lang="sv-SE" smtClean="0"/>
-              <a:t>2020-04-16</a:t>
+              <a:t>2020-05-18</a:t>
             </a:fld>
             <a:endParaRPr lang="sv-SE"/>
           </a:p>
@@ -12588,7 +12588,7 @@
           <a:p>
             <a:fld id="{250C9EB5-F68C-4689-94F6-49C30221888E}" type="datetime1">
               <a:rPr lang="sv-SE" smtClean="0"/>
-              <a:t>2020-04-16</a:t>
+              <a:t>2020-05-18</a:t>
             </a:fld>
             <a:endParaRPr lang="sv-SE"/>
           </a:p>
@@ -12849,7 +12849,7 @@
           <a:p>
             <a:fld id="{7DD110CA-AEED-4DF4-83DE-18633E56C29F}" type="datetime1">
               <a:rPr lang="sv-SE" smtClean="0"/>
-              <a:t>2020-04-16</a:t>
+              <a:t>2020-05-18</a:t>
             </a:fld>
             <a:endParaRPr lang="sv-SE"/>
           </a:p>
@@ -13023,7 +13023,7 @@
           <a:p>
             <a:fld id="{9B2AEE04-1216-4AB6-8CF8-50DAF2F9BED2}" type="datetime1">
               <a:rPr lang="sv-SE" smtClean="0"/>
-              <a:t>2020-04-16</a:t>
+              <a:t>2020-05-18</a:t>
             </a:fld>
             <a:endParaRPr lang="sv-SE"/>
           </a:p>
@@ -13207,7 +13207,7 @@
           <a:p>
             <a:fld id="{FA578C12-CAD3-4D2D-9DA2-12AF1DD8FC8B}" type="datetime1">
               <a:rPr lang="sv-SE" smtClean="0"/>
-              <a:t>2020-04-16</a:t>
+              <a:t>2020-05-18</a:t>
             </a:fld>
             <a:endParaRPr lang="sv-SE"/>
           </a:p>
@@ -13741,7 +13741,7 @@
                   <a:prstClr val="black"/>
                 </a:solidFill>
               </a:rPr>
-              <a:t>2020-04-16</a:t>
+              <a:t>2020-05-18</a:t>
             </a:fld>
             <a:endParaRPr lang="en-GB" dirty="0">
               <a:solidFill>
@@ -14161,7 +14161,7 @@
                   <a:prstClr val="black"/>
                 </a:solidFill>
               </a:rPr>
-              <a:t>2020-04-16</a:t>
+              <a:t>2020-05-18</a:t>
             </a:fld>
             <a:endParaRPr lang="en-GB" dirty="0">
               <a:solidFill>
@@ -14484,7 +14484,7 @@
                   <a:prstClr val="black"/>
                 </a:solidFill>
               </a:rPr>
-              <a:t>2020-04-16</a:t>
+              <a:t>2020-05-18</a:t>
             </a:fld>
             <a:endParaRPr lang="en-GB" dirty="0">
               <a:solidFill>
@@ -14784,7 +14784,7 @@
                   <a:prstClr val="black"/>
                 </a:solidFill>
               </a:rPr>
-              <a:t>2020-04-16</a:t>
+              <a:t>2020-05-18</a:t>
             </a:fld>
             <a:endParaRPr lang="en-GB" dirty="0">
               <a:solidFill>
@@ -15297,7 +15297,7 @@
                   <a:prstClr val="black"/>
                 </a:solidFill>
               </a:rPr>
-              <a:t>2020-04-16</a:t>
+              <a:t>2020-05-18</a:t>
             </a:fld>
             <a:endParaRPr lang="en-GB" dirty="0">
               <a:solidFill>
@@ -15534,7 +15534,7 @@
                   <a:prstClr val="black"/>
                 </a:solidFill>
               </a:rPr>
-              <a:t>2020-04-16</a:t>
+              <a:t>2020-05-18</a:t>
             </a:fld>
             <a:endParaRPr lang="en-GB" dirty="0">
               <a:solidFill>
@@ -16437,7 +16437,7 @@
           <a:p>
             <a:fld id="{B7BDDC76-5D53-4957-9832-0AD3879DA754}" type="datetime1">
               <a:rPr lang="sv-SE" smtClean="0"/>
-              <a:t>2020-04-16</a:t>
+              <a:t>2020-05-18</a:t>
             </a:fld>
             <a:endParaRPr lang="sv-SE"/>
           </a:p>
@@ -18358,63 +18358,66 @@
           <a:bodyPr/>
           <a:lstStyle/>
           <a:p>
-            <a:pPr marL="457200" indent="-457200">
-              <a:buFont typeface="Arial" panose="020B0604020202020204" pitchFamily="34" charset="0"/>
-              <a:buChar char="•"/>
-            </a:pPr>
-            <a:r>
-              <a:rPr lang="en-US" dirty="0"/>
-              <a:t>The energy system is a complicated network of processes and flows</a:t>
-            </a:r>
-          </a:p>
-          <a:p>
-            <a:pPr marL="457200" indent="-457200">
-              <a:buFont typeface="Arial" panose="020B0604020202020204" pitchFamily="34" charset="0"/>
-              <a:buChar char="•"/>
-            </a:pPr>
-            <a:r>
-              <a:rPr lang="en-US" dirty="0"/>
-              <a:t>Models are a useful tool to understand the energy system and formulate sound energy policies</a:t>
-            </a:r>
-          </a:p>
-          <a:p>
-            <a:pPr marL="457200" indent="-457200">
-              <a:buFont typeface="Arial" panose="020B0604020202020204" pitchFamily="34" charset="0"/>
-              <a:buChar char="•"/>
-            </a:pPr>
-            <a:r>
-              <a:rPr lang="en-US" dirty="0"/>
-              <a:t>Energy models provide </a:t>
-            </a:r>
-            <a:r>
-              <a:rPr lang="en-US" b="1" dirty="0"/>
-              <a:t>insights for energy policies, not numbers</a:t>
-            </a:r>
-          </a:p>
-          <a:p>
-            <a:pPr marL="457200" indent="-457200">
-              <a:buFont typeface="Arial" panose="020B0604020202020204" pitchFamily="34" charset="0"/>
-              <a:buChar char="•"/>
-            </a:pPr>
-            <a:r>
-              <a:rPr lang="en-US" dirty="0"/>
-              <a:t>Modelling tools can be categorized into top-down and bottom-up. We will look at one type of bottom-up tools: </a:t>
-            </a:r>
-            <a:r>
-              <a:rPr lang="en-US" b="1" dirty="0"/>
-              <a:t>optimization tools</a:t>
-            </a:r>
-          </a:p>
-        </p:txBody>
-      </p:sp>
-      <p:sp>
-        <p:nvSpPr>
-          <p:cNvPr id="5" name="Slide Number Placeholder 4"/>
+            <a:r>
+              <a:rPr lang="sv-SE" dirty="0" smtClean="0"/>
+              <a:t>Special </a:t>
+            </a:r>
+            <a:r>
+              <a:rPr lang="sv-SE" dirty="0" err="1" smtClean="0"/>
+              <a:t>characters</a:t>
+            </a:r>
+            <a:endParaRPr lang="sv-SE" dirty="0" smtClean="0"/>
+          </a:p>
+          <a:p>
+            <a:r>
+              <a:rPr lang="it-IT" dirty="0" smtClean="0"/>
+              <a:t> </a:t>
+            </a:r>
+          </a:p>
+          <a:p>
+            <a:r>
+              <a:rPr lang="it-IT" dirty="0" smtClean="0"/>
+              <a:t>3 dots </a:t>
+            </a:r>
+            <a:r>
+              <a:rPr lang="it-IT" dirty="0"/>
+              <a:t>... </a:t>
+            </a:r>
+            <a:endParaRPr lang="it-IT" dirty="0" smtClean="0"/>
+          </a:p>
+          <a:p>
+            <a:r>
+              <a:rPr lang="it-IT" dirty="0" smtClean="0"/>
+              <a:t>3 apostrophes ''' </a:t>
+            </a:r>
+          </a:p>
+          <a:p>
+            <a:r>
+              <a:rPr lang="it-IT" dirty="0" smtClean="0"/>
+              <a:t>minus – </a:t>
+            </a:r>
+          </a:p>
+          <a:p>
+            <a:r>
+              <a:rPr lang="it-IT" dirty="0" smtClean="0"/>
+              <a:t>u </a:t>
+            </a:r>
+            <a:r>
+              <a:rPr lang="it-IT" dirty="0"/>
+              <a:t>ü</a:t>
+            </a:r>
+            <a:endParaRPr lang="sv-SE" dirty="0"/>
+          </a:p>
+        </p:txBody>
+      </p:sp>
+      <p:sp>
+        <p:nvSpPr>
+          <p:cNvPr id="3" name="Footer Placeholder 2"/>
           <p:cNvSpPr>
             <a:spLocks noGrp="1"/>
           </p:cNvSpPr>
           <p:nvPr>
-            <p:ph type="sldNum" sz="quarter" idx="12"/>
+            <p:ph type="ftr" sz="quarter" idx="11"/>
           </p:nvPr>
         </p:nvSpPr>
         <p:spPr/>
@@ -18422,7 +18425,30 @@
           <a:bodyPr/>
           <a:lstStyle/>
           <a:p>
-            <a:fld id="{A0B7FA9A-6BCF-4CFA-8685-B7A43319A6CD}" type="slidenum">
+            <a:r>
+              <a:rPr lang="en-GB" smtClean="0"/>
+              <a:t>MJ2380-2381 2020</a:t>
+            </a:r>
+            <a:endParaRPr lang="en-GB" dirty="0"/>
+          </a:p>
+        </p:txBody>
+      </p:sp>
+      <p:sp>
+        <p:nvSpPr>
+          <p:cNvPr id="4" name="Slide Number Placeholder 3"/>
+          <p:cNvSpPr>
+            <a:spLocks noGrp="1"/>
+          </p:cNvSpPr>
+          <p:nvPr>
+            <p:ph type="sldNum" sz="quarter" idx="12"/>
+          </p:nvPr>
+        </p:nvSpPr>
+        <p:spPr/>
+        <p:txBody>
+          <a:bodyPr/>
+          <a:lstStyle/>
+          <a:p>
+            <a:fld id="{F36C87F6-986D-49E6-AF40-1B3A1EE8064D}" type="slidenum">
               <a:rPr lang="en-GB" smtClean="0"/>
               <a:pPr/>
               <a:t>14</a:t>
@@ -18433,7 +18459,7 @@
       </p:sp>
       <p:sp>
         <p:nvSpPr>
-          <p:cNvPr id="6" name="Title 5"/>
+          <p:cNvPr id="5" name="Title 4"/>
           <p:cNvSpPr>
             <a:spLocks noGrp="1"/>
           </p:cNvSpPr>
@@ -18447,69 +18473,25 @@
           <a:lstStyle/>
           <a:p>
             <a:r>
-              <a:rPr lang="sv-SE" dirty="0" err="1"/>
-              <a:t>Key</a:t>
-            </a:r>
-            <a:r>
-              <a:rPr lang="sv-SE" dirty="0"/>
-              <a:t> </a:t>
-            </a:r>
-            <a:r>
-              <a:rPr lang="sv-SE" dirty="0" err="1"/>
-              <a:t>take</a:t>
-            </a:r>
-            <a:r>
-              <a:rPr lang="sv-SE" dirty="0"/>
-              <a:t> </a:t>
-            </a:r>
-            <a:r>
-              <a:rPr lang="sv-SE" dirty="0" err="1"/>
-              <a:t>away</a:t>
-            </a:r>
-            <a:r>
-              <a:rPr lang="sv-SE" dirty="0"/>
-              <a:t> </a:t>
-            </a:r>
-            <a:r>
-              <a:rPr lang="sv-SE" dirty="0" err="1"/>
-              <a:t>messages</a:t>
+              <a:rPr lang="sv-SE" dirty="0" smtClean="0"/>
+              <a:t>Special </a:t>
+            </a:r>
+            <a:r>
+              <a:rPr lang="sv-SE" dirty="0" err="1" smtClean="0"/>
+              <a:t>characters</a:t>
+            </a:r>
+            <a:r>
+              <a:rPr lang="sv-SE" dirty="0" smtClean="0"/>
+              <a:t> minus -</a:t>
             </a:r>
             <a:endParaRPr lang="sv-SE" dirty="0"/>
-          </a:p>
-        </p:txBody>
-      </p:sp>
-      <p:sp>
-        <p:nvSpPr>
-          <p:cNvPr id="7" name="Footer Placeholder 4"/>
-          <p:cNvSpPr>
-            <a:spLocks noGrp="1"/>
-          </p:cNvSpPr>
-          <p:nvPr>
-            <p:ph type="ftr" sz="quarter" idx="11"/>
-          </p:nvPr>
-        </p:nvSpPr>
-        <p:spPr>
-          <a:xfrm>
-            <a:off x="4038600" y="6356350"/>
-            <a:ext cx="4114800" cy="365125"/>
-          </a:xfrm>
-        </p:spPr>
-        <p:txBody>
-          <a:bodyPr/>
-          <a:lstStyle/>
-          <a:p>
-            <a:r>
-              <a:rPr lang="en-GB" smtClean="0"/>
-              <a:t>MJ2380-2381 2020</a:t>
-            </a:r>
-            <a:endParaRPr lang="en-GB" dirty="0"/>
           </a:p>
         </p:txBody>
       </p:sp>
     </p:spTree>
     <p:extLst>
       <p:ext uri="{BB962C8B-B14F-4D97-AF65-F5344CB8AC3E}">
-        <p14:creationId xmlns:p14="http://schemas.microsoft.com/office/powerpoint/2010/main" val="2837304566"/>
+        <p14:creationId xmlns:p14="http://schemas.microsoft.com/office/powerpoint/2010/main" val="2982139804"/>
       </p:ext>
     </p:extLst>
   </p:cSld>
@@ -18528,13 +18510,6 @@
       </p:transition>
     </mc:Fallback>
   </mc:AlternateContent>
-  <p:timing>
-    <p:tnLst>
-      <p:par>
-        <p:cTn id="1" dur="indefinite" restart="never" nodeType="tmRoot"/>
-      </p:par>
-    </p:tnLst>
-  </p:timing>
 </p:sld>
 </file>
 
@@ -18570,66 +18545,51 @@
           <a:bodyPr/>
           <a:lstStyle/>
           <a:p>
-            <a:pPr marL="285750" lvl="1" indent="-285750">
-              <a:spcAft>
-                <a:spcPct val="50000"/>
-              </a:spcAft>
+            <a:pPr marL="457200" indent="-457200">
+              <a:buFont typeface="Arial" panose="020B0604020202020204" pitchFamily="34" charset="0"/>
+              <a:buChar char="•"/>
             </a:pPr>
             <a:r>
-              <a:rPr lang="sv-SE" dirty="0"/>
-              <a:t>Modelling for insights, not numbers - Huntington et al.  (1982): </a:t>
-            </a:r>
-            <a:r>
-              <a:rPr lang="sv-SE" dirty="0">
-                <a:hlinkClick r:id="rId3"/>
-              </a:rPr>
-              <a:t>https://www.sciencedirect.com/science/article/pii/0305048382900020</a:t>
-            </a:r>
-            <a:r>
-              <a:rPr lang="sv-SE" dirty="0"/>
-              <a:t> </a:t>
-            </a:r>
-          </a:p>
-          <a:p>
-            <a:pPr marL="285750" lvl="1" indent="-285750">
-              <a:spcAft>
-                <a:spcPct val="50000"/>
-              </a:spcAft>
+              <a:rPr lang="en-US" dirty="0"/>
+              <a:t>The energy system is a complicated network of processes and flows</a:t>
+            </a:r>
+          </a:p>
+          <a:p>
+            <a:pPr marL="457200" indent="-457200">
+              <a:buFont typeface="Arial" panose="020B0604020202020204" pitchFamily="34" charset="0"/>
+              <a:buChar char="•"/>
             </a:pPr>
             <a:r>
-              <a:rPr lang="sv-SE" dirty="0"/>
-              <a:t>Categorisation of modelling tools – Herbst et al. (2012): </a:t>
-            </a:r>
-            <a:r>
-              <a:rPr lang="sv-SE" dirty="0">
-                <a:hlinkClick r:id="rId4"/>
-              </a:rPr>
-              <a:t>https://link.springer.com/content/pdf/10.1007%2FBF03399363.pdf</a:t>
-            </a:r>
-            <a:r>
-              <a:rPr lang="sv-SE" dirty="0"/>
-              <a:t> </a:t>
-            </a:r>
-          </a:p>
-          <a:p>
-            <a:pPr marL="285750" lvl="1" indent="-285750">
-              <a:spcAft>
-                <a:spcPct val="50000"/>
-              </a:spcAft>
+              <a:rPr lang="en-US" dirty="0"/>
+              <a:t>Models are a useful tool to understand the energy system and formulate sound energy policies</a:t>
+            </a:r>
+          </a:p>
+          <a:p>
+            <a:pPr marL="457200" indent="-457200">
+              <a:buFont typeface="Arial" panose="020B0604020202020204" pitchFamily="34" charset="0"/>
+              <a:buChar char="•"/>
             </a:pPr>
             <a:r>
-              <a:rPr lang="sv-SE" dirty="0"/>
-              <a:t>Review of different categorisation methods – Müller et al. (2018): </a:t>
-            </a:r>
-            <a:r>
-              <a:rPr lang="sv-SE" dirty="0">
-                <a:hlinkClick r:id="rId5"/>
-              </a:rPr>
-              <a:t>https://www.sciencedirect.com/science/article/pii/S2211467X18300154</a:t>
-            </a:r>
-            <a:r>
-              <a:rPr lang="sv-SE" dirty="0"/>
-              <a:t> </a:t>
+              <a:rPr lang="en-US" dirty="0"/>
+              <a:t>Energy models provide </a:t>
+            </a:r>
+            <a:r>
+              <a:rPr lang="en-US" b="1" dirty="0"/>
+              <a:t>insights for energy policies, not numbers</a:t>
+            </a:r>
+          </a:p>
+          <a:p>
+            <a:pPr marL="457200" indent="-457200">
+              <a:buFont typeface="Arial" panose="020B0604020202020204" pitchFamily="34" charset="0"/>
+              <a:buChar char="•"/>
+            </a:pPr>
+            <a:r>
+              <a:rPr lang="en-US" dirty="0"/>
+              <a:t>Modelling tools can be categorized into top-down and bottom-up. We will look at one type of bottom-up tools: </a:t>
+            </a:r>
+            <a:r>
+              <a:rPr lang="en-US" b="1" dirty="0"/>
+              <a:t>optimization tools</a:t>
             </a:r>
           </a:p>
         </p:txBody>
@@ -18674,9 +18634,34 @@
           <a:lstStyle/>
           <a:p>
             <a:r>
+              <a:rPr lang="sv-SE" dirty="0" err="1"/>
+              <a:t>Key</a:t>
+            </a:r>
+            <a:r>
               <a:rPr lang="sv-SE" dirty="0"/>
-              <a:t>Reading material</a:t>
-            </a:r>
+              <a:t> </a:t>
+            </a:r>
+            <a:r>
+              <a:rPr lang="sv-SE" dirty="0" err="1"/>
+              <a:t>take</a:t>
+            </a:r>
+            <a:r>
+              <a:rPr lang="sv-SE" dirty="0"/>
+              <a:t> </a:t>
+            </a:r>
+            <a:r>
+              <a:rPr lang="sv-SE" dirty="0" err="1"/>
+              <a:t>away</a:t>
+            </a:r>
+            <a:r>
+              <a:rPr lang="sv-SE" dirty="0"/>
+              <a:t> </a:t>
+            </a:r>
+            <a:r>
+              <a:rPr lang="sv-SE" dirty="0" err="1"/>
+              <a:t>messages</a:t>
+            </a:r>
+            <a:endParaRPr lang="sv-SE" dirty="0"/>
           </a:p>
         </p:txBody>
       </p:sp>
@@ -18711,7 +18696,7 @@
     </p:spTree>
     <p:extLst>
       <p:ext uri="{BB962C8B-B14F-4D97-AF65-F5344CB8AC3E}">
-        <p14:creationId xmlns:p14="http://schemas.microsoft.com/office/powerpoint/2010/main" val="1208241015"/>
+        <p14:creationId xmlns:p14="http://schemas.microsoft.com/office/powerpoint/2010/main" val="2837304566"/>
       </p:ext>
     </p:extLst>
   </p:cSld>
@@ -18759,6 +18744,208 @@
       </p:grpSpPr>
       <p:sp>
         <p:nvSpPr>
+          <p:cNvPr id="2" name="Content Placeholder 1"/>
+          <p:cNvSpPr>
+            <a:spLocks noGrp="1"/>
+          </p:cNvSpPr>
+          <p:nvPr>
+            <p:ph idx="1"/>
+          </p:nvPr>
+        </p:nvSpPr>
+        <p:spPr/>
+        <p:txBody>
+          <a:bodyPr/>
+          <a:lstStyle/>
+          <a:p>
+            <a:pPr marL="285750" lvl="1" indent="-285750">
+              <a:spcAft>
+                <a:spcPct val="50000"/>
+              </a:spcAft>
+            </a:pPr>
+            <a:r>
+              <a:rPr lang="sv-SE" dirty="0"/>
+              <a:t>Modelling for insights, not numbers - Huntington et al.  (1982): </a:t>
+            </a:r>
+            <a:r>
+              <a:rPr lang="sv-SE" dirty="0">
+                <a:hlinkClick r:id="rId3"/>
+              </a:rPr>
+              <a:t>https://www.sciencedirect.com/science/article/pii/0305048382900020</a:t>
+            </a:r>
+            <a:r>
+              <a:rPr lang="sv-SE" dirty="0"/>
+              <a:t> </a:t>
+            </a:r>
+          </a:p>
+          <a:p>
+            <a:pPr marL="285750" lvl="1" indent="-285750">
+              <a:spcAft>
+                <a:spcPct val="50000"/>
+              </a:spcAft>
+            </a:pPr>
+            <a:r>
+              <a:rPr lang="sv-SE" dirty="0"/>
+              <a:t>Categorisation of modelling tools – Herbst et al. (2012): </a:t>
+            </a:r>
+            <a:r>
+              <a:rPr lang="sv-SE" dirty="0">
+                <a:hlinkClick r:id="rId4"/>
+              </a:rPr>
+              <a:t>https://link.springer.com/content/pdf/10.1007%2FBF03399363.pdf</a:t>
+            </a:r>
+            <a:r>
+              <a:rPr lang="sv-SE" dirty="0"/>
+              <a:t> </a:t>
+            </a:r>
+          </a:p>
+          <a:p>
+            <a:pPr marL="285750" lvl="1" indent="-285750">
+              <a:spcAft>
+                <a:spcPct val="50000"/>
+              </a:spcAft>
+            </a:pPr>
+            <a:r>
+              <a:rPr lang="sv-SE" dirty="0"/>
+              <a:t>Review of different categorisation methods – Müller et al. (2018): </a:t>
+            </a:r>
+            <a:r>
+              <a:rPr lang="sv-SE" dirty="0">
+                <a:hlinkClick r:id="rId5"/>
+              </a:rPr>
+              <a:t>https://www.sciencedirect.com/science/article/pii/S2211467X18300154</a:t>
+            </a:r>
+            <a:r>
+              <a:rPr lang="sv-SE" dirty="0"/>
+              <a:t> </a:t>
+            </a:r>
+          </a:p>
+        </p:txBody>
+      </p:sp>
+      <p:sp>
+        <p:nvSpPr>
+          <p:cNvPr id="5" name="Slide Number Placeholder 4"/>
+          <p:cNvSpPr>
+            <a:spLocks noGrp="1"/>
+          </p:cNvSpPr>
+          <p:nvPr>
+            <p:ph type="sldNum" sz="quarter" idx="12"/>
+          </p:nvPr>
+        </p:nvSpPr>
+        <p:spPr/>
+        <p:txBody>
+          <a:bodyPr/>
+          <a:lstStyle/>
+          <a:p>
+            <a:fld id="{A0B7FA9A-6BCF-4CFA-8685-B7A43319A6CD}" type="slidenum">
+              <a:rPr lang="en-GB" smtClean="0"/>
+              <a:pPr/>
+              <a:t>16</a:t>
+            </a:fld>
+            <a:endParaRPr lang="en-GB" dirty="0"/>
+          </a:p>
+        </p:txBody>
+      </p:sp>
+      <p:sp>
+        <p:nvSpPr>
+          <p:cNvPr id="6" name="Title 5"/>
+          <p:cNvSpPr>
+            <a:spLocks noGrp="1"/>
+          </p:cNvSpPr>
+          <p:nvPr>
+            <p:ph type="title"/>
+          </p:nvPr>
+        </p:nvSpPr>
+        <p:spPr/>
+        <p:txBody>
+          <a:bodyPr/>
+          <a:lstStyle/>
+          <a:p>
+            <a:r>
+              <a:rPr lang="sv-SE" dirty="0"/>
+              <a:t>Reading material</a:t>
+            </a:r>
+          </a:p>
+        </p:txBody>
+      </p:sp>
+      <p:sp>
+        <p:nvSpPr>
+          <p:cNvPr id="7" name="Footer Placeholder 4"/>
+          <p:cNvSpPr>
+            <a:spLocks noGrp="1"/>
+          </p:cNvSpPr>
+          <p:nvPr>
+            <p:ph type="ftr" sz="quarter" idx="11"/>
+          </p:nvPr>
+        </p:nvSpPr>
+        <p:spPr>
+          <a:xfrm>
+            <a:off x="4038600" y="6356350"/>
+            <a:ext cx="4114800" cy="365125"/>
+          </a:xfrm>
+        </p:spPr>
+        <p:txBody>
+          <a:bodyPr/>
+          <a:lstStyle/>
+          <a:p>
+            <a:r>
+              <a:rPr lang="en-GB" smtClean="0"/>
+              <a:t>MJ2380-2381 2020</a:t>
+            </a:r>
+            <a:endParaRPr lang="en-GB" dirty="0"/>
+          </a:p>
+        </p:txBody>
+      </p:sp>
+    </p:spTree>
+    <p:extLst>
+      <p:ext uri="{BB962C8B-B14F-4D97-AF65-F5344CB8AC3E}">
+        <p14:creationId xmlns:p14="http://schemas.microsoft.com/office/powerpoint/2010/main" val="1208241015"/>
+      </p:ext>
+    </p:extLst>
+  </p:cSld>
+  <p:clrMapOvr>
+    <a:masterClrMapping/>
+  </p:clrMapOvr>
+  <mc:AlternateContent xmlns:mc="http://schemas.openxmlformats.org/markup-compatibility/2006" xmlns:p14="http://schemas.microsoft.com/office/powerpoint/2010/main">
+    <mc:Choice Requires="p14">
+      <p:transition spd="med" p14:dur="700">
+        <p:fade/>
+      </p:transition>
+    </mc:Choice>
+    <mc:Fallback xmlns="">
+      <p:transition spd="med">
+        <p:fade/>
+      </p:transition>
+    </mc:Fallback>
+  </mc:AlternateContent>
+  <p:timing>
+    <p:tnLst>
+      <p:par>
+        <p:cTn id="1" dur="indefinite" restart="never" nodeType="tmRoot"/>
+      </p:par>
+    </p:tnLst>
+  </p:timing>
+</p:sld>
+</file>
+
+<file path=ppt/slides/slide17.xml><?xml version="1.0" encoding="utf-8"?>
+<p:sld xmlns:a="http://schemas.openxmlformats.org/drawingml/2006/main" xmlns:r="http://schemas.openxmlformats.org/officeDocument/2006/relationships" xmlns:p="http://schemas.openxmlformats.org/presentationml/2006/main">
+  <p:cSld>
+    <p:spTree>
+      <p:nvGrpSpPr>
+        <p:cNvPr id="1" name=""/>
+        <p:cNvGrpSpPr/>
+        <p:nvPr/>
+      </p:nvGrpSpPr>
+      <p:grpSpPr>
+        <a:xfrm>
+          <a:off x="0" y="0"/>
+          <a:ext cx="0" cy="0"/>
+          <a:chOff x="0" y="0"/>
+          <a:chExt cx="0" cy="0"/>
+        </a:xfrm>
+      </p:grpSpPr>
+      <p:sp>
+        <p:nvSpPr>
           <p:cNvPr id="3" name="Title 2"/>
           <p:cNvSpPr>
             <a:spLocks noGrp="1"/>
@@ -18850,7 +19037,7 @@
                 </a:solidFill>
               </a:rPr>
               <a:pPr/>
-              <a:t>16</a:t>
+              <a:t>17</a:t>
             </a:fld>
             <a:endParaRPr lang="en-GB" sz="1400" dirty="0">
               <a:solidFill>
@@ -22738,6 +22925,14 @@
 </file>
 
 <file path=customXml/itemProps1.xml><?xml version="1.0" encoding="utf-8"?>
+<ds:datastoreItem xmlns:ds="http://schemas.openxmlformats.org/officeDocument/2006/customXml" ds:itemID="{C617D7A1-438A-4842-B3E3-9908A6EB6D2C}">
+  <ds:schemaRefs>
+    <ds:schemaRef ds:uri="http://schemas.microsoft.com/VisualStudio/2011/storyboarding/control"/>
+  </ds:schemaRefs>
+</ds:datastoreItem>
+</file>
+
+<file path=customXml/itemProps2.xml><?xml version="1.0" encoding="utf-8"?>
 <ds:datastoreItem xmlns:ds="http://schemas.openxmlformats.org/officeDocument/2006/customXml" ds:itemID="{C4C77668-3C09-4800-9078-32A63FDB8878}">
   <ds:schemaRefs>
     <ds:schemaRef ds:uri="http://schemas.microsoft.com/VisualStudio/2011/storyboarding/control"/>
@@ -22745,15 +22940,47 @@
 </ds:datastoreItem>
 </file>
 
-<file path=customXml/itemProps2.xml><?xml version="1.0" encoding="utf-8"?>
-<ds:datastoreItem xmlns:ds="http://schemas.openxmlformats.org/officeDocument/2006/customXml" ds:itemID="{C617D7A1-438A-4842-B3E3-9908A6EB6D2C}">
+<file path=customXml/itemProps3.xml><?xml version="1.0" encoding="utf-8"?>
+<ds:datastoreItem xmlns:ds="http://schemas.openxmlformats.org/officeDocument/2006/customXml" ds:itemID="{2611C6C5-73A8-4088-8E8F-45AC80A93639}">
   <ds:schemaRefs>
     <ds:schemaRef ds:uri="http://schemas.microsoft.com/VisualStudio/2011/storyboarding/control"/>
   </ds:schemaRefs>
 </ds:datastoreItem>
 </file>
 
-<file path=customXml/itemProps3.xml><?xml version="1.0" encoding="utf-8"?>
+<file path=customXml/itemProps4.xml><?xml version="1.0" encoding="utf-8"?>
+<ds:datastoreItem xmlns:ds="http://schemas.openxmlformats.org/officeDocument/2006/customXml" ds:itemID="{1CFCFB3A-1124-4BB9-AF75-CF97631426FE}">
+  <ds:schemaRefs>
+    <ds:schemaRef ds:uri="http://schemas.microsoft.com/VisualStudio/2011/storyboarding/control"/>
+  </ds:schemaRefs>
+</ds:datastoreItem>
+</file>
+
+<file path=customXml/itemProps5.xml><?xml version="1.0" encoding="utf-8"?>
+<ds:datastoreItem xmlns:ds="http://schemas.openxmlformats.org/officeDocument/2006/customXml" ds:itemID="{834A27C6-F506-436C-BE80-EBD990020008}">
+  <ds:schemaRefs>
+    <ds:schemaRef ds:uri="http://schemas.microsoft.com/VisualStudio/2011/storyboarding/control"/>
+  </ds:schemaRefs>
+</ds:datastoreItem>
+</file>
+
+<file path=customXml/itemProps6.xml><?xml version="1.0" encoding="utf-8"?>
+<ds:datastoreItem xmlns:ds="http://schemas.openxmlformats.org/officeDocument/2006/customXml" ds:itemID="{0103A532-5B2C-4425-9F2A-7F4721A16C4C}">
+  <ds:schemaRefs>
+    <ds:schemaRef ds:uri="http://schemas.microsoft.com/VisualStudio/2011/storyboarding/control"/>
+  </ds:schemaRefs>
+</ds:datastoreItem>
+</file>
+
+<file path=customXml/itemProps7.xml><?xml version="1.0" encoding="utf-8"?>
+<ds:datastoreItem xmlns:ds="http://schemas.openxmlformats.org/officeDocument/2006/customXml" ds:itemID="{E01F304E-8A23-4F3A-A522-8F0F304C2F57}">
+  <ds:schemaRefs>
+    <ds:schemaRef ds:uri="http://schemas.microsoft.com/VisualStudio/2011/storyboarding/control"/>
+  </ds:schemaRefs>
+</ds:datastoreItem>
+</file>
+
+<file path=customXml/itemProps8.xml><?xml version="1.0" encoding="utf-8"?>
 <ds:datastoreItem xmlns:ds="http://schemas.openxmlformats.org/officeDocument/2006/customXml" ds:itemID="{25B0A9D5-AA86-40E5-8BB9-BF6B6793A753}">
   <ds:schemaRefs>
     <ds:schemaRef ds:uri="http://schemas.microsoft.com/VisualStudio/2011/storyboarding/control"/>
@@ -22761,50 +22988,10 @@
 </ds:datastoreItem>
 </file>
 
-<file path=customXml/itemProps4.xml><?xml version="1.0" encoding="utf-8"?>
-<ds:datastoreItem xmlns:ds="http://schemas.openxmlformats.org/officeDocument/2006/customXml" ds:itemID="{834A27C6-F506-436C-BE80-EBD990020008}">
-  <ds:schemaRefs>
-    <ds:schemaRef ds:uri="http://schemas.microsoft.com/VisualStudio/2011/storyboarding/control"/>
-  </ds:schemaRefs>
-</ds:datastoreItem>
-</file>
-
-<file path=customXml/itemProps5.xml><?xml version="1.0" encoding="utf-8"?>
-<ds:datastoreItem xmlns:ds="http://schemas.openxmlformats.org/officeDocument/2006/customXml" ds:itemID="{1CFCFB3A-1124-4BB9-AF75-CF97631426FE}">
-  <ds:schemaRefs>
-    <ds:schemaRef ds:uri="http://schemas.microsoft.com/VisualStudio/2011/storyboarding/control"/>
-  </ds:schemaRefs>
-</ds:datastoreItem>
-</file>
-
-<file path=customXml/itemProps6.xml><?xml version="1.0" encoding="utf-8"?>
-<ds:datastoreItem xmlns:ds="http://schemas.openxmlformats.org/officeDocument/2006/customXml" ds:itemID="{2611C6C5-73A8-4088-8E8F-45AC80A93639}">
-  <ds:schemaRefs>
-    <ds:schemaRef ds:uri="http://schemas.microsoft.com/VisualStudio/2011/storyboarding/control"/>
-  </ds:schemaRefs>
-</ds:datastoreItem>
-</file>
-
-<file path=customXml/itemProps7.xml><?xml version="1.0" encoding="utf-8"?>
+<file path=customXml/itemProps9.xml><?xml version="1.0" encoding="utf-8"?>
 <ds:datastoreItem xmlns:ds="http://schemas.openxmlformats.org/officeDocument/2006/customXml" ds:itemID="{25A3FA23-A2B3-408D-BAC0-3974AD01A403}">
   <ds:schemaRefs>
     <ds:schemaRef ds:uri="http://schemas.microsoft.com/VisualStudio/2011/storyboarding/control"/>
   </ds:schemaRefs>
 </ds:datastoreItem>
-</file>
-
-<file path=customXml/itemProps8.xml><?xml version="1.0" encoding="utf-8"?>
-<ds:datastoreItem xmlns:ds="http://schemas.openxmlformats.org/officeDocument/2006/customXml" ds:itemID="{E01F304E-8A23-4F3A-A522-8F0F304C2F57}">
-  <ds:schemaRefs>
-    <ds:schemaRef ds:uri="http://schemas.microsoft.com/VisualStudio/2011/storyboarding/control"/>
-  </ds:schemaRefs>
-</ds:datastoreItem>
-</file>
-
-<file path=customXml/itemProps9.xml><?xml version="1.0" encoding="utf-8"?>
-<ds:datastoreItem xmlns:ds="http://schemas.openxmlformats.org/officeDocument/2006/customXml" ds:itemID="{0103A532-5B2C-4425-9F2A-7F4721A16C4C}">
-  <ds:schemaRefs>
-    <ds:schemaRef ds:uri="http://schemas.microsoft.com/VisualStudio/2011/storyboarding/control"/>
-  </ds:schemaRefs>
-</ds:datastoreItem>
 </file>
</xml_diff>

<commit_message>
fixed bug layout, improved conversion
</commit_message>
<xml_diff>
--- a/files/ppt_presentations/ppt_demo.pptx
+++ b/files/ppt_presentations/ppt_demo.pptx
@@ -6,7 +6,7 @@
     <p:sldMasterId id="2147483699" r:id="rId11"/>
   </p:sldMasterIdLst>
   <p:notesMasterIdLst>
-    <p:notesMasterId r:id="rId29"/>
+    <p:notesMasterId r:id="rId27"/>
   </p:notesMasterIdLst>
   <p:sldIdLst>
     <p:sldId id="257" r:id="rId12"/>
@@ -23,9 +23,7 @@
     <p:sldId id="495" r:id="rId23"/>
     <p:sldId id="502" r:id="rId24"/>
     <p:sldId id="503" r:id="rId25"/>
-    <p:sldId id="339" r:id="rId26"/>
-    <p:sldId id="380" r:id="rId27"/>
-    <p:sldId id="330" r:id="rId28"/>
+    <p:sldId id="330" r:id="rId26"/>
   </p:sldIdLst>
   <p:sldSz cx="12192000" cy="6858000"/>
   <p:notesSz cx="6858000" cy="9144000"/>
@@ -158,14 +156,10 @@
           <p14:sldIdLst/>
         </p14:section>
         <p14:section name="Take away msgs" id="{16D7CF31-CDF3-4111-8DCD-8588E03A5D92}">
-          <p14:sldIdLst>
-            <p14:sldId id="339"/>
-          </p14:sldIdLst>
+          <p14:sldIdLst/>
         </p14:section>
         <p14:section name="Reading material" id="{15C5C907-E101-4DBA-B571-77ECC30B49F0}">
-          <p14:sldIdLst>
-            <p14:sldId id="380"/>
-          </p14:sldIdLst>
+          <p14:sldIdLst/>
         </p14:section>
         <p14:section name="End" id="{55D73A6D-AEDA-4891-9572-75FE8797DEA6}">
           <p14:sldIdLst>
@@ -4839,7 +4833,7 @@
           <a:p>
             <a:fld id="{C53FC889-3B05-4F6A-9AB7-C2521E883D0A}" type="datetimeFigureOut">
               <a:rPr lang="en-GB" smtClean="0"/>
-              <a:t>18/05/2020</a:t>
+              <a:t>19/05/2020</a:t>
             </a:fld>
             <a:endParaRPr lang="en-GB" dirty="0"/>
           </a:p>
@@ -5556,174 +5550,6 @@
 </p:notes>
 </file>
 
-<file path=ppt/notesSlides/notesSlide4.xml><?xml version="1.0" encoding="utf-8"?>
-<p:notes xmlns:a="http://schemas.openxmlformats.org/drawingml/2006/main" xmlns:r="http://schemas.openxmlformats.org/officeDocument/2006/relationships" xmlns:p="http://schemas.openxmlformats.org/presentationml/2006/main">
-  <p:cSld>
-    <p:spTree>
-      <p:nvGrpSpPr>
-        <p:cNvPr id="1" name=""/>
-        <p:cNvGrpSpPr/>
-        <p:nvPr/>
-      </p:nvGrpSpPr>
-      <p:grpSpPr>
-        <a:xfrm>
-          <a:off x="0" y="0"/>
-          <a:ext cx="0" cy="0"/>
-          <a:chOff x="0" y="0"/>
-          <a:chExt cx="0" cy="0"/>
-        </a:xfrm>
-      </p:grpSpPr>
-      <p:sp>
-        <p:nvSpPr>
-          <p:cNvPr id="2" name="Slide Image Placeholder 1"/>
-          <p:cNvSpPr>
-            <a:spLocks noGrp="1" noRot="1" noChangeAspect="1"/>
-          </p:cNvSpPr>
-          <p:nvPr>
-            <p:ph type="sldImg"/>
-          </p:nvPr>
-        </p:nvSpPr>
-        <p:spPr/>
-      </p:sp>
-      <p:sp>
-        <p:nvSpPr>
-          <p:cNvPr id="3" name="Notes Placeholder 2"/>
-          <p:cNvSpPr>
-            <a:spLocks noGrp="1"/>
-          </p:cNvSpPr>
-          <p:nvPr>
-            <p:ph type="body" idx="1"/>
-          </p:nvPr>
-        </p:nvSpPr>
-        <p:spPr/>
-        <p:txBody>
-          <a:bodyPr/>
-          <a:lstStyle/>
-          <a:p>
-            <a:endParaRPr lang="en-US"/>
-          </a:p>
-        </p:txBody>
-      </p:sp>
-      <p:sp>
-        <p:nvSpPr>
-          <p:cNvPr id="4" name="Slide Number Placeholder 3"/>
-          <p:cNvSpPr>
-            <a:spLocks noGrp="1"/>
-          </p:cNvSpPr>
-          <p:nvPr>
-            <p:ph type="sldNum" sz="quarter" idx="10"/>
-          </p:nvPr>
-        </p:nvSpPr>
-        <p:spPr/>
-        <p:txBody>
-          <a:bodyPr/>
-          <a:lstStyle/>
-          <a:p>
-            <a:fld id="{253E99D3-575E-4B33-AEE3-580024E0F63F}" type="slidenum">
-              <a:rPr lang="en-GB" smtClean="0"/>
-              <a:t>15</a:t>
-            </a:fld>
-            <a:endParaRPr lang="en-GB"/>
-          </a:p>
-        </p:txBody>
-      </p:sp>
-    </p:spTree>
-    <p:extLst>
-      <p:ext uri="{BB962C8B-B14F-4D97-AF65-F5344CB8AC3E}">
-        <p14:creationId xmlns:p14="http://schemas.microsoft.com/office/powerpoint/2010/main" val="4058711562"/>
-      </p:ext>
-    </p:extLst>
-  </p:cSld>
-  <p:clrMapOvr>
-    <a:masterClrMapping/>
-  </p:clrMapOvr>
-</p:notes>
-</file>
-
-<file path=ppt/notesSlides/notesSlide5.xml><?xml version="1.0" encoding="utf-8"?>
-<p:notes xmlns:a="http://schemas.openxmlformats.org/drawingml/2006/main" xmlns:r="http://schemas.openxmlformats.org/officeDocument/2006/relationships" xmlns:p="http://schemas.openxmlformats.org/presentationml/2006/main">
-  <p:cSld>
-    <p:spTree>
-      <p:nvGrpSpPr>
-        <p:cNvPr id="1" name=""/>
-        <p:cNvGrpSpPr/>
-        <p:nvPr/>
-      </p:nvGrpSpPr>
-      <p:grpSpPr>
-        <a:xfrm>
-          <a:off x="0" y="0"/>
-          <a:ext cx="0" cy="0"/>
-          <a:chOff x="0" y="0"/>
-          <a:chExt cx="0" cy="0"/>
-        </a:xfrm>
-      </p:grpSpPr>
-      <p:sp>
-        <p:nvSpPr>
-          <p:cNvPr id="2" name="Slide Image Placeholder 1"/>
-          <p:cNvSpPr>
-            <a:spLocks noGrp="1" noRot="1" noChangeAspect="1"/>
-          </p:cNvSpPr>
-          <p:nvPr>
-            <p:ph type="sldImg"/>
-          </p:nvPr>
-        </p:nvSpPr>
-        <p:spPr/>
-      </p:sp>
-      <p:sp>
-        <p:nvSpPr>
-          <p:cNvPr id="3" name="Notes Placeholder 2"/>
-          <p:cNvSpPr>
-            <a:spLocks noGrp="1"/>
-          </p:cNvSpPr>
-          <p:nvPr>
-            <p:ph type="body" idx="1"/>
-          </p:nvPr>
-        </p:nvSpPr>
-        <p:spPr/>
-        <p:txBody>
-          <a:bodyPr/>
-          <a:lstStyle/>
-          <a:p>
-            <a:endParaRPr lang="en-US"/>
-          </a:p>
-        </p:txBody>
-      </p:sp>
-      <p:sp>
-        <p:nvSpPr>
-          <p:cNvPr id="4" name="Slide Number Placeholder 3"/>
-          <p:cNvSpPr>
-            <a:spLocks noGrp="1"/>
-          </p:cNvSpPr>
-          <p:nvPr>
-            <p:ph type="sldNum" sz="quarter" idx="10"/>
-          </p:nvPr>
-        </p:nvSpPr>
-        <p:spPr/>
-        <p:txBody>
-          <a:bodyPr/>
-          <a:lstStyle/>
-          <a:p>
-            <a:fld id="{253E99D3-575E-4B33-AEE3-580024E0F63F}" type="slidenum">
-              <a:rPr lang="en-GB" smtClean="0"/>
-              <a:t>16</a:t>
-            </a:fld>
-            <a:endParaRPr lang="en-GB"/>
-          </a:p>
-        </p:txBody>
-      </p:sp>
-    </p:spTree>
-    <p:extLst>
-      <p:ext uri="{BB962C8B-B14F-4D97-AF65-F5344CB8AC3E}">
-        <p14:creationId xmlns:p14="http://schemas.microsoft.com/office/powerpoint/2010/main" val="804459243"/>
-      </p:ext>
-    </p:extLst>
-  </p:cSld>
-  <p:clrMapOvr>
-    <a:masterClrMapping/>
-  </p:clrMapOvr>
-</p:notes>
-</file>
-
 <file path=ppt/slideLayouts/slideLayout1.xml><?xml version="1.0" encoding="utf-8"?>
 <p:sldLayout xmlns:a="http://schemas.openxmlformats.org/drawingml/2006/main" xmlns:r="http://schemas.openxmlformats.org/officeDocument/2006/relationships" xmlns:p="http://schemas.openxmlformats.org/presentationml/2006/main" type="title" preserve="1">
   <p:cSld name="Title Slide">
@@ -5875,7 +5701,7 @@
           <a:p>
             <a:fld id="{9EFE7453-B082-4124-B5AE-B87EE023CDB1}" type="datetime1">
               <a:rPr lang="sv-SE" smtClean="0"/>
-              <a:t>2020-05-18</a:t>
+              <a:t>2020-05-19</a:t>
             </a:fld>
             <a:endParaRPr lang="en-GB" dirty="0"/>
           </a:p>
@@ -6121,7 +5947,7 @@
                   <a:prstClr val="black"/>
                 </a:solidFill>
               </a:rPr>
-              <a:t>2020-05-18</a:t>
+              <a:t>2020-05-19</a:t>
             </a:fld>
             <a:endParaRPr lang="en-GB" dirty="0">
               <a:solidFill>
@@ -6489,7 +6315,7 @@
                   <a:prstClr val="black"/>
                 </a:solidFill>
               </a:rPr>
-              <a:t>2020-05-18</a:t>
+              <a:t>2020-05-19</a:t>
             </a:fld>
             <a:endParaRPr lang="en-GB" dirty="0">
               <a:solidFill>
@@ -6772,7 +6598,7 @@
                   <a:prstClr val="black"/>
                 </a:solidFill>
               </a:rPr>
-              <a:t>2020-05-18</a:t>
+              <a:t>2020-05-19</a:t>
             </a:fld>
             <a:endParaRPr lang="en-GB" dirty="0">
               <a:solidFill>
@@ -7098,7 +6924,7 @@
                   <a:prstClr val="black"/>
                 </a:solidFill>
               </a:rPr>
-              <a:t>2020-05-18</a:t>
+              <a:t>2020-05-19</a:t>
             </a:fld>
             <a:endParaRPr lang="en-GB" dirty="0">
               <a:solidFill>
@@ -7369,7 +7195,7 @@
                   <a:prstClr val="black"/>
                 </a:solidFill>
               </a:rPr>
-              <a:t>2020-05-18</a:t>
+              <a:t>2020-05-19</a:t>
             </a:fld>
             <a:endParaRPr lang="en-GB" dirty="0">
               <a:solidFill>
@@ -7555,7 +7381,7 @@
                   <a:prstClr val="black"/>
                 </a:solidFill>
               </a:rPr>
-              <a:t>2020-05-18</a:t>
+              <a:t>2020-05-19</a:t>
             </a:fld>
             <a:endParaRPr lang="en-GB" dirty="0">
               <a:solidFill>
@@ -9836,7 +9662,7 @@
                   <a:prstClr val="black"/>
                 </a:solidFill>
               </a:rPr>
-              <a:t>2020-05-18</a:t>
+              <a:t>2020-05-19</a:t>
             </a:fld>
             <a:endParaRPr lang="en-GB" dirty="0">
               <a:solidFill>
@@ -10585,7 +10411,7 @@
             </a:pPr>
             <a:fld id="{D1537DF4-BE14-43E4-9A37-FFE4AFD6E832}" type="datetime1">
               <a:rPr lang="sv-SE" smtClean="0"/>
-              <a:t>2020-05-18</a:t>
+              <a:t>2020-05-19</a:t>
             </a:fld>
             <a:endParaRPr lang="sv-SE"/>
           </a:p>
@@ -10809,7 +10635,7 @@
           <a:p>
             <a:fld id="{80F358A9-049B-44CD-82AF-D1F2A38D371E}" type="datetime1">
               <a:rPr lang="sv-SE" smtClean="0"/>
-              <a:t>2020-05-18</a:t>
+              <a:t>2020-05-19</a:t>
             </a:fld>
             <a:endParaRPr lang="sv-SE"/>
           </a:p>
@@ -10978,7 +10804,7 @@
           <a:p>
             <a:fld id="{0EFFECE1-EFDB-4ED4-A92B-EC11843FA500}" type="datetime1">
               <a:rPr lang="sv-SE" smtClean="0"/>
-              <a:t>2020-05-18</a:t>
+              <a:t>2020-05-19</a:t>
             </a:fld>
             <a:endParaRPr lang="en-US" dirty="0"/>
           </a:p>
@@ -11229,7 +11055,7 @@
           <a:p>
             <a:fld id="{3E8B38C6-DEFB-43C3-9001-532227D2C227}" type="datetime1">
               <a:rPr lang="sv-SE" smtClean="0"/>
-              <a:t>2020-05-18</a:t>
+              <a:t>2020-05-19</a:t>
             </a:fld>
             <a:endParaRPr lang="sv-SE"/>
           </a:p>
@@ -11479,7 +11305,7 @@
           <a:p>
             <a:fld id="{4D6B0352-3FAF-4997-A408-54821387E8C2}" type="datetime1">
               <a:rPr lang="sv-SE" smtClean="0"/>
-              <a:t>2020-05-18</a:t>
+              <a:t>2020-05-19</a:t>
             </a:fld>
             <a:endParaRPr lang="sv-SE"/>
           </a:p>
@@ -11715,7 +11541,7 @@
           <a:p>
             <a:fld id="{716563E9-3DC5-4469-9964-FF98F1612663}" type="datetime1">
               <a:rPr lang="sv-SE" smtClean="0"/>
-              <a:t>2020-05-18</a:t>
+              <a:t>2020-05-19</a:t>
             </a:fld>
             <a:endParaRPr lang="sv-SE"/>
           </a:p>
@@ -12086,7 +11912,7 @@
           <a:p>
             <a:fld id="{1CBF595A-354E-4185-8569-5903072BC314}" type="datetime1">
               <a:rPr lang="sv-SE" smtClean="0"/>
-              <a:t>2020-05-18</a:t>
+              <a:t>2020-05-19</a:t>
             </a:fld>
             <a:endParaRPr lang="sv-SE"/>
           </a:p>
@@ -12208,7 +12034,7 @@
           <a:p>
             <a:fld id="{BFCB468F-8F0C-4472-9C74-13DD7D928865}" type="datetime1">
               <a:rPr lang="sv-SE" smtClean="0"/>
-              <a:t>2020-05-18</a:t>
+              <a:t>2020-05-19</a:t>
             </a:fld>
             <a:endParaRPr lang="sv-SE"/>
           </a:p>
@@ -12307,7 +12133,7 @@
           <a:p>
             <a:fld id="{BC504758-5BE1-4D18-AD7B-70303133ACF8}" type="datetime1">
               <a:rPr lang="sv-SE" smtClean="0"/>
-              <a:t>2020-05-18</a:t>
+              <a:t>2020-05-19</a:t>
             </a:fld>
             <a:endParaRPr lang="sv-SE"/>
           </a:p>
@@ -12588,7 +12414,7 @@
           <a:p>
             <a:fld id="{250C9EB5-F68C-4689-94F6-49C30221888E}" type="datetime1">
               <a:rPr lang="sv-SE" smtClean="0"/>
-              <a:t>2020-05-18</a:t>
+              <a:t>2020-05-19</a:t>
             </a:fld>
             <a:endParaRPr lang="sv-SE"/>
           </a:p>
@@ -12849,7 +12675,7 @@
           <a:p>
             <a:fld id="{7DD110CA-AEED-4DF4-83DE-18633E56C29F}" type="datetime1">
               <a:rPr lang="sv-SE" smtClean="0"/>
-              <a:t>2020-05-18</a:t>
+              <a:t>2020-05-19</a:t>
             </a:fld>
             <a:endParaRPr lang="sv-SE"/>
           </a:p>
@@ -13023,7 +12849,7 @@
           <a:p>
             <a:fld id="{9B2AEE04-1216-4AB6-8CF8-50DAF2F9BED2}" type="datetime1">
               <a:rPr lang="sv-SE" smtClean="0"/>
-              <a:t>2020-05-18</a:t>
+              <a:t>2020-05-19</a:t>
             </a:fld>
             <a:endParaRPr lang="sv-SE"/>
           </a:p>
@@ -13207,7 +13033,7 @@
           <a:p>
             <a:fld id="{FA578C12-CAD3-4D2D-9DA2-12AF1DD8FC8B}" type="datetime1">
               <a:rPr lang="sv-SE" smtClean="0"/>
-              <a:t>2020-05-18</a:t>
+              <a:t>2020-05-19</a:t>
             </a:fld>
             <a:endParaRPr lang="sv-SE"/>
           </a:p>
@@ -13741,7 +13567,7 @@
                   <a:prstClr val="black"/>
                 </a:solidFill>
               </a:rPr>
-              <a:t>2020-05-18</a:t>
+              <a:t>2020-05-19</a:t>
             </a:fld>
             <a:endParaRPr lang="en-GB" dirty="0">
               <a:solidFill>
@@ -14161,7 +13987,7 @@
                   <a:prstClr val="black"/>
                 </a:solidFill>
               </a:rPr>
-              <a:t>2020-05-18</a:t>
+              <a:t>2020-05-19</a:t>
             </a:fld>
             <a:endParaRPr lang="en-GB" dirty="0">
               <a:solidFill>
@@ -14484,7 +14310,7 @@
                   <a:prstClr val="black"/>
                 </a:solidFill>
               </a:rPr>
-              <a:t>2020-05-18</a:t>
+              <a:t>2020-05-19</a:t>
             </a:fld>
             <a:endParaRPr lang="en-GB" dirty="0">
               <a:solidFill>
@@ -14784,7 +14610,7 @@
                   <a:prstClr val="black"/>
                 </a:solidFill>
               </a:rPr>
-              <a:t>2020-05-18</a:t>
+              <a:t>2020-05-19</a:t>
             </a:fld>
             <a:endParaRPr lang="en-GB" dirty="0">
               <a:solidFill>
@@ -15297,7 +15123,7 @@
                   <a:prstClr val="black"/>
                 </a:solidFill>
               </a:rPr>
-              <a:t>2020-05-18</a:t>
+              <a:t>2020-05-19</a:t>
             </a:fld>
             <a:endParaRPr lang="en-GB" dirty="0">
               <a:solidFill>
@@ -15534,7 +15360,7 @@
                   <a:prstClr val="black"/>
                 </a:solidFill>
               </a:rPr>
-              <a:t>2020-05-18</a:t>
+              <a:t>2020-05-19</a:t>
             </a:fld>
             <a:endParaRPr lang="en-GB" dirty="0">
               <a:solidFill>
@@ -16437,7 +16263,7 @@
           <a:p>
             <a:fld id="{B7BDDC76-5D53-4957-9832-0AD3879DA754}" type="datetime1">
               <a:rPr lang="sv-SE" smtClean="0"/>
-              <a:t>2020-05-18</a:t>
+              <a:t>2020-05-19</a:t>
             </a:fld>
             <a:endParaRPr lang="sv-SE"/>
           </a:p>
@@ -16992,6 +16818,147 @@
             <a:endParaRPr lang="sv-SE" dirty="0">
               <a:solidFill>
                 <a:prstClr val="black"/>
+              </a:solidFill>
+            </a:endParaRPr>
+          </a:p>
+        </p:txBody>
+      </p:sp>
+      <p:sp>
+        <p:nvSpPr>
+          <p:cNvPr id="6" name="TextBox 5"/>
+          <p:cNvSpPr txBox="1"/>
+          <p:nvPr/>
+        </p:nvSpPr>
+        <p:spPr>
+          <a:xfrm>
+            <a:off x="9826906" y="347241"/>
+            <a:ext cx="1666755" cy="497711"/>
+          </a:xfrm>
+          <a:prstGeom prst="rect">
+            <a:avLst/>
+          </a:prstGeom>
+        </p:spPr>
+        <p:txBody>
+          <a:bodyPr vert="horz" wrap="square" lIns="91440" tIns="0" rIns="91440" bIns="0" rtlCol="0" anchor="t">
+            <a:normAutofit/>
+          </a:bodyPr>
+          <a:lstStyle/>
+          <a:p>
+            <a:pPr marL="457200"/>
+            <a:r>
+              <a:rPr lang="sv-SE" sz="1600" b="1" spc="-150" dirty="0">
+                <a:solidFill>
+                  <a:srgbClr val="FF0000"/>
+                </a:solidFill>
+              </a:rPr>
+              <a:t>Logo </a:t>
+            </a:r>
+            <a:r>
+              <a:rPr lang="sv-SE" sz="1600" b="1" spc="-150" dirty="0" err="1">
+                <a:solidFill>
+                  <a:srgbClr val="FF0000"/>
+                </a:solidFill>
+              </a:rPr>
+              <a:t>OSeMOSYS</a:t>
+            </a:r>
+            <a:endParaRPr lang="sv-SE" sz="1600" b="1" spc="-150" dirty="0">
+              <a:solidFill>
+                <a:srgbClr val="FF0000"/>
+              </a:solidFill>
+            </a:endParaRPr>
+          </a:p>
+        </p:txBody>
+      </p:sp>
+      <p:sp>
+        <p:nvSpPr>
+          <p:cNvPr id="9" name="TextBox 8"/>
+          <p:cNvSpPr txBox="1"/>
+          <p:nvPr/>
+        </p:nvSpPr>
+        <p:spPr>
+          <a:xfrm>
+            <a:off x="10000527" y="914400"/>
+            <a:ext cx="1353273" cy="524055"/>
+          </a:xfrm>
+          <a:prstGeom prst="rect">
+            <a:avLst/>
+          </a:prstGeom>
+        </p:spPr>
+        <p:txBody>
+          <a:bodyPr vert="horz" wrap="square" lIns="91440" tIns="0" rIns="91440" bIns="0" rtlCol="0" anchor="t">
+            <a:normAutofit/>
+          </a:bodyPr>
+          <a:lstStyle/>
+          <a:p>
+            <a:pPr marL="457200" indent="0"/>
+            <a:r>
+              <a:rPr lang="sv-SE" sz="1600" b="1" spc="-150" dirty="0" smtClean="0">
+                <a:solidFill>
+                  <a:srgbClr val="FF0000"/>
+                </a:solidFill>
+                <a:latin typeface="+mn-lt"/>
+              </a:rPr>
+              <a:t>Logo </a:t>
+            </a:r>
+            <a:r>
+              <a:rPr lang="sv-SE" sz="1600" b="1" spc="-150" dirty="0" err="1" smtClean="0">
+                <a:solidFill>
+                  <a:srgbClr val="FF0000"/>
+                </a:solidFill>
+                <a:latin typeface="+mn-lt"/>
+              </a:rPr>
+              <a:t>optimus</a:t>
+            </a:r>
+            <a:endParaRPr lang="sv-SE" sz="3000" b="1" spc="-150" dirty="0" smtClean="0">
+              <a:solidFill>
+                <a:srgbClr val="FF0000"/>
+              </a:solidFill>
+              <a:latin typeface="+mn-lt"/>
+            </a:endParaRPr>
+          </a:p>
+        </p:txBody>
+      </p:sp>
+      <p:sp>
+        <p:nvSpPr>
+          <p:cNvPr id="10" name="TextBox 9"/>
+          <p:cNvSpPr txBox="1"/>
+          <p:nvPr/>
+        </p:nvSpPr>
+        <p:spPr>
+          <a:xfrm>
+            <a:off x="838200" y="347241"/>
+            <a:ext cx="1114425" cy="1091214"/>
+          </a:xfrm>
+          <a:prstGeom prst="rect">
+            <a:avLst/>
+          </a:prstGeom>
+        </p:spPr>
+        <p:txBody>
+          <a:bodyPr vert="horz" wrap="square" lIns="91440" tIns="0" rIns="91440" bIns="0" rtlCol="0" anchor="t">
+            <a:normAutofit/>
+          </a:bodyPr>
+          <a:lstStyle/>
+          <a:p>
+            <a:pPr marL="457200"/>
+            <a:r>
+              <a:rPr lang="sv-SE" sz="1600" b="1" spc="-150">
+                <a:solidFill>
+                  <a:srgbClr val="FF0000"/>
+                </a:solidFill>
+              </a:rPr>
+              <a:t>Logo </a:t>
+            </a:r>
+            <a:r>
+              <a:rPr lang="sv-SE" sz="1600" b="1" spc="-150" smtClean="0">
+                <a:solidFill>
+                  <a:srgbClr val="FF0000"/>
+                </a:solidFill>
+              </a:rPr>
+              <a:t>KTH</a:t>
+            </a:r>
+            <a:endParaRPr lang="sv-SE" sz="1600" b="1" spc="-150" dirty="0">
+              <a:solidFill>
+                <a:srgbClr val="FF0000"/>
               </a:solidFill>
             </a:endParaRPr>
           </a:p>
@@ -18355,7 +18322,9 @@
         </p:nvSpPr>
         <p:spPr/>
         <p:txBody>
-          <a:bodyPr/>
+          <a:bodyPr>
+            <a:normAutofit fontScale="92500" lnSpcReduction="10000"/>
+          </a:bodyPr>
           <a:lstStyle/>
           <a:p>
             <a:r>
@@ -18400,12 +18369,80 @@
           <a:p>
             <a:r>
               <a:rPr lang="it-IT" dirty="0" smtClean="0"/>
-              <a:t>u </a:t>
-            </a:r>
-            <a:r>
-              <a:rPr lang="it-IT" dirty="0"/>
-              <a:t>ü</a:t>
-            </a:r>
+              <a:t>u ü</a:t>
+            </a:r>
+          </a:p>
+          <a:p>
+            <a:r>
+              <a:rPr lang="it-IT" dirty="0" smtClean="0"/>
+              <a:t>Greek letters: </a:t>
+            </a:r>
+            <a:r>
+              <a:rPr lang="el-GR" dirty="0"/>
+              <a:t>: Α α, Β β, Γ γ, Δ δ, Ε ε, Ζ ζ, </a:t>
+            </a:r>
+            <a:r>
+              <a:rPr lang="el-GR" dirty="0" smtClean="0"/>
+              <a:t>Η</a:t>
+            </a:r>
+            <a:endParaRPr lang="sv-SE" dirty="0"/>
+          </a:p>
+          <a:p>
+            <a:r>
+              <a:rPr lang="sv-SE" dirty="0" err="1" smtClean="0"/>
+              <a:t>Disuguaglianze</a:t>
+            </a:r>
+            <a:r>
+              <a:rPr lang="sv-SE" dirty="0" smtClean="0"/>
+              <a:t>: &gt; = &lt; </a:t>
+            </a:r>
+          </a:p>
+          <a:p>
+            <a:r>
+              <a:rPr lang="sv-SE" dirty="0" err="1"/>
+              <a:t>Chinese</a:t>
+            </a:r>
+            <a:r>
+              <a:rPr lang="sv-SE" dirty="0"/>
+              <a:t> </a:t>
+            </a:r>
+            <a:r>
+              <a:rPr lang="sv-SE" dirty="0" err="1"/>
+              <a:t>Characters</a:t>
+            </a:r>
+            <a:r>
+              <a:rPr lang="sv-SE" dirty="0"/>
+              <a:t>: </a:t>
+            </a:r>
+            <a:r>
+              <a:rPr lang="ja-JP" altLang="sv-SE" dirty="0"/>
+              <a:t>會意</a:t>
+            </a:r>
+            <a:r>
+              <a:rPr lang="ja-JP" altLang="sv-SE" dirty="0"/>
+              <a:t>字</a:t>
+            </a:r>
+            <a:endParaRPr lang="sv-SE" altLang="ja-JP" dirty="0"/>
+          </a:p>
+          <a:p>
+            <a:r>
+              <a:rPr lang="sv-SE" altLang="ja-JP" dirty="0"/>
+              <a:t>Accents: </a:t>
+            </a:r>
+            <a:r>
+              <a:rPr lang="sv-SE" dirty="0"/>
+              <a:t>ä ö </a:t>
+            </a:r>
+            <a:r>
+              <a:rPr lang="sv-SE" dirty="0"/>
+              <a:t>ü à á å </a:t>
+            </a:r>
+            <a:endParaRPr lang="sv-SE" dirty="0"/>
+          </a:p>
+          <a:p>
+            <a:endParaRPr lang="sv-SE" altLang="ja-JP" dirty="0" smtClean="0"/>
+          </a:p>
+          <a:p>
             <a:endParaRPr lang="sv-SE" dirty="0"/>
           </a:p>
         </p:txBody>
@@ -18532,420 +18569,6 @@
       </p:grpSpPr>
       <p:sp>
         <p:nvSpPr>
-          <p:cNvPr id="2" name="Content Placeholder 1"/>
-          <p:cNvSpPr>
-            <a:spLocks noGrp="1"/>
-          </p:cNvSpPr>
-          <p:nvPr>
-            <p:ph idx="1"/>
-          </p:nvPr>
-        </p:nvSpPr>
-        <p:spPr/>
-        <p:txBody>
-          <a:bodyPr/>
-          <a:lstStyle/>
-          <a:p>
-            <a:pPr marL="457200" indent="-457200">
-              <a:buFont typeface="Arial" panose="020B0604020202020204" pitchFamily="34" charset="0"/>
-              <a:buChar char="•"/>
-            </a:pPr>
-            <a:r>
-              <a:rPr lang="en-US" dirty="0"/>
-              <a:t>The energy system is a complicated network of processes and flows</a:t>
-            </a:r>
-          </a:p>
-          <a:p>
-            <a:pPr marL="457200" indent="-457200">
-              <a:buFont typeface="Arial" panose="020B0604020202020204" pitchFamily="34" charset="0"/>
-              <a:buChar char="•"/>
-            </a:pPr>
-            <a:r>
-              <a:rPr lang="en-US" dirty="0"/>
-              <a:t>Models are a useful tool to understand the energy system and formulate sound energy policies</a:t>
-            </a:r>
-          </a:p>
-          <a:p>
-            <a:pPr marL="457200" indent="-457200">
-              <a:buFont typeface="Arial" panose="020B0604020202020204" pitchFamily="34" charset="0"/>
-              <a:buChar char="•"/>
-            </a:pPr>
-            <a:r>
-              <a:rPr lang="en-US" dirty="0"/>
-              <a:t>Energy models provide </a:t>
-            </a:r>
-            <a:r>
-              <a:rPr lang="en-US" b="1" dirty="0"/>
-              <a:t>insights for energy policies, not numbers</a:t>
-            </a:r>
-          </a:p>
-          <a:p>
-            <a:pPr marL="457200" indent="-457200">
-              <a:buFont typeface="Arial" panose="020B0604020202020204" pitchFamily="34" charset="0"/>
-              <a:buChar char="•"/>
-            </a:pPr>
-            <a:r>
-              <a:rPr lang="en-US" dirty="0"/>
-              <a:t>Modelling tools can be categorized into top-down and bottom-up. We will look at one type of bottom-up tools: </a:t>
-            </a:r>
-            <a:r>
-              <a:rPr lang="en-US" b="1" dirty="0"/>
-              <a:t>optimization tools</a:t>
-            </a:r>
-          </a:p>
-        </p:txBody>
-      </p:sp>
-      <p:sp>
-        <p:nvSpPr>
-          <p:cNvPr id="5" name="Slide Number Placeholder 4"/>
-          <p:cNvSpPr>
-            <a:spLocks noGrp="1"/>
-          </p:cNvSpPr>
-          <p:nvPr>
-            <p:ph type="sldNum" sz="quarter" idx="12"/>
-          </p:nvPr>
-        </p:nvSpPr>
-        <p:spPr/>
-        <p:txBody>
-          <a:bodyPr/>
-          <a:lstStyle/>
-          <a:p>
-            <a:fld id="{A0B7FA9A-6BCF-4CFA-8685-B7A43319A6CD}" type="slidenum">
-              <a:rPr lang="en-GB" smtClean="0"/>
-              <a:pPr/>
-              <a:t>15</a:t>
-            </a:fld>
-            <a:endParaRPr lang="en-GB" dirty="0"/>
-          </a:p>
-        </p:txBody>
-      </p:sp>
-      <p:sp>
-        <p:nvSpPr>
-          <p:cNvPr id="6" name="Title 5"/>
-          <p:cNvSpPr>
-            <a:spLocks noGrp="1"/>
-          </p:cNvSpPr>
-          <p:nvPr>
-            <p:ph type="title"/>
-          </p:nvPr>
-        </p:nvSpPr>
-        <p:spPr/>
-        <p:txBody>
-          <a:bodyPr/>
-          <a:lstStyle/>
-          <a:p>
-            <a:r>
-              <a:rPr lang="sv-SE" dirty="0" err="1"/>
-              <a:t>Key</a:t>
-            </a:r>
-            <a:r>
-              <a:rPr lang="sv-SE" dirty="0"/>
-              <a:t> </a:t>
-            </a:r>
-            <a:r>
-              <a:rPr lang="sv-SE" dirty="0" err="1"/>
-              <a:t>take</a:t>
-            </a:r>
-            <a:r>
-              <a:rPr lang="sv-SE" dirty="0"/>
-              <a:t> </a:t>
-            </a:r>
-            <a:r>
-              <a:rPr lang="sv-SE" dirty="0" err="1"/>
-              <a:t>away</a:t>
-            </a:r>
-            <a:r>
-              <a:rPr lang="sv-SE" dirty="0"/>
-              <a:t> </a:t>
-            </a:r>
-            <a:r>
-              <a:rPr lang="sv-SE" dirty="0" err="1"/>
-              <a:t>messages</a:t>
-            </a:r>
-            <a:endParaRPr lang="sv-SE" dirty="0"/>
-          </a:p>
-        </p:txBody>
-      </p:sp>
-      <p:sp>
-        <p:nvSpPr>
-          <p:cNvPr id="7" name="Footer Placeholder 4"/>
-          <p:cNvSpPr>
-            <a:spLocks noGrp="1"/>
-          </p:cNvSpPr>
-          <p:nvPr>
-            <p:ph type="ftr" sz="quarter" idx="11"/>
-          </p:nvPr>
-        </p:nvSpPr>
-        <p:spPr>
-          <a:xfrm>
-            <a:off x="4038600" y="6356350"/>
-            <a:ext cx="4114800" cy="365125"/>
-          </a:xfrm>
-        </p:spPr>
-        <p:txBody>
-          <a:bodyPr/>
-          <a:lstStyle/>
-          <a:p>
-            <a:r>
-              <a:rPr lang="en-GB" smtClean="0"/>
-              <a:t>MJ2380-2381 2020</a:t>
-            </a:r>
-            <a:endParaRPr lang="en-GB" dirty="0"/>
-          </a:p>
-        </p:txBody>
-      </p:sp>
-    </p:spTree>
-    <p:extLst>
-      <p:ext uri="{BB962C8B-B14F-4D97-AF65-F5344CB8AC3E}">
-        <p14:creationId xmlns:p14="http://schemas.microsoft.com/office/powerpoint/2010/main" val="2837304566"/>
-      </p:ext>
-    </p:extLst>
-  </p:cSld>
-  <p:clrMapOvr>
-    <a:masterClrMapping/>
-  </p:clrMapOvr>
-  <mc:AlternateContent xmlns:mc="http://schemas.openxmlformats.org/markup-compatibility/2006" xmlns:p14="http://schemas.microsoft.com/office/powerpoint/2010/main">
-    <mc:Choice Requires="p14">
-      <p:transition spd="med" p14:dur="700">
-        <p:fade/>
-      </p:transition>
-    </mc:Choice>
-    <mc:Fallback xmlns="">
-      <p:transition spd="med">
-        <p:fade/>
-      </p:transition>
-    </mc:Fallback>
-  </mc:AlternateContent>
-  <p:timing>
-    <p:tnLst>
-      <p:par>
-        <p:cTn id="1" dur="indefinite" restart="never" nodeType="tmRoot"/>
-      </p:par>
-    </p:tnLst>
-  </p:timing>
-</p:sld>
-</file>
-
-<file path=ppt/slides/slide16.xml><?xml version="1.0" encoding="utf-8"?>
-<p:sld xmlns:a="http://schemas.openxmlformats.org/drawingml/2006/main" xmlns:r="http://schemas.openxmlformats.org/officeDocument/2006/relationships" xmlns:p="http://schemas.openxmlformats.org/presentationml/2006/main">
-  <p:cSld>
-    <p:spTree>
-      <p:nvGrpSpPr>
-        <p:cNvPr id="1" name=""/>
-        <p:cNvGrpSpPr/>
-        <p:nvPr/>
-      </p:nvGrpSpPr>
-      <p:grpSpPr>
-        <a:xfrm>
-          <a:off x="0" y="0"/>
-          <a:ext cx="0" cy="0"/>
-          <a:chOff x="0" y="0"/>
-          <a:chExt cx="0" cy="0"/>
-        </a:xfrm>
-      </p:grpSpPr>
-      <p:sp>
-        <p:nvSpPr>
-          <p:cNvPr id="2" name="Content Placeholder 1"/>
-          <p:cNvSpPr>
-            <a:spLocks noGrp="1"/>
-          </p:cNvSpPr>
-          <p:nvPr>
-            <p:ph idx="1"/>
-          </p:nvPr>
-        </p:nvSpPr>
-        <p:spPr/>
-        <p:txBody>
-          <a:bodyPr/>
-          <a:lstStyle/>
-          <a:p>
-            <a:pPr marL="285750" lvl="1" indent="-285750">
-              <a:spcAft>
-                <a:spcPct val="50000"/>
-              </a:spcAft>
-            </a:pPr>
-            <a:r>
-              <a:rPr lang="sv-SE" dirty="0"/>
-              <a:t>Modelling for insights, not numbers - Huntington et al.  (1982): </a:t>
-            </a:r>
-            <a:r>
-              <a:rPr lang="sv-SE" dirty="0">
-                <a:hlinkClick r:id="rId3"/>
-              </a:rPr>
-              <a:t>https://www.sciencedirect.com/science/article/pii/0305048382900020</a:t>
-            </a:r>
-            <a:r>
-              <a:rPr lang="sv-SE" dirty="0"/>
-              <a:t> </a:t>
-            </a:r>
-          </a:p>
-          <a:p>
-            <a:pPr marL="285750" lvl="1" indent="-285750">
-              <a:spcAft>
-                <a:spcPct val="50000"/>
-              </a:spcAft>
-            </a:pPr>
-            <a:r>
-              <a:rPr lang="sv-SE" dirty="0"/>
-              <a:t>Categorisation of modelling tools – Herbst et al. (2012): </a:t>
-            </a:r>
-            <a:r>
-              <a:rPr lang="sv-SE" dirty="0">
-                <a:hlinkClick r:id="rId4"/>
-              </a:rPr>
-              <a:t>https://link.springer.com/content/pdf/10.1007%2FBF03399363.pdf</a:t>
-            </a:r>
-            <a:r>
-              <a:rPr lang="sv-SE" dirty="0"/>
-              <a:t> </a:t>
-            </a:r>
-          </a:p>
-          <a:p>
-            <a:pPr marL="285750" lvl="1" indent="-285750">
-              <a:spcAft>
-                <a:spcPct val="50000"/>
-              </a:spcAft>
-            </a:pPr>
-            <a:r>
-              <a:rPr lang="sv-SE" dirty="0"/>
-              <a:t>Review of different categorisation methods – Müller et al. (2018): </a:t>
-            </a:r>
-            <a:r>
-              <a:rPr lang="sv-SE" dirty="0">
-                <a:hlinkClick r:id="rId5"/>
-              </a:rPr>
-              <a:t>https://www.sciencedirect.com/science/article/pii/S2211467X18300154</a:t>
-            </a:r>
-            <a:r>
-              <a:rPr lang="sv-SE" dirty="0"/>
-              <a:t> </a:t>
-            </a:r>
-          </a:p>
-        </p:txBody>
-      </p:sp>
-      <p:sp>
-        <p:nvSpPr>
-          <p:cNvPr id="5" name="Slide Number Placeholder 4"/>
-          <p:cNvSpPr>
-            <a:spLocks noGrp="1"/>
-          </p:cNvSpPr>
-          <p:nvPr>
-            <p:ph type="sldNum" sz="quarter" idx="12"/>
-          </p:nvPr>
-        </p:nvSpPr>
-        <p:spPr/>
-        <p:txBody>
-          <a:bodyPr/>
-          <a:lstStyle/>
-          <a:p>
-            <a:fld id="{A0B7FA9A-6BCF-4CFA-8685-B7A43319A6CD}" type="slidenum">
-              <a:rPr lang="en-GB" smtClean="0"/>
-              <a:pPr/>
-              <a:t>16</a:t>
-            </a:fld>
-            <a:endParaRPr lang="en-GB" dirty="0"/>
-          </a:p>
-        </p:txBody>
-      </p:sp>
-      <p:sp>
-        <p:nvSpPr>
-          <p:cNvPr id="6" name="Title 5"/>
-          <p:cNvSpPr>
-            <a:spLocks noGrp="1"/>
-          </p:cNvSpPr>
-          <p:nvPr>
-            <p:ph type="title"/>
-          </p:nvPr>
-        </p:nvSpPr>
-        <p:spPr/>
-        <p:txBody>
-          <a:bodyPr/>
-          <a:lstStyle/>
-          <a:p>
-            <a:r>
-              <a:rPr lang="sv-SE" dirty="0"/>
-              <a:t>Reading material</a:t>
-            </a:r>
-          </a:p>
-        </p:txBody>
-      </p:sp>
-      <p:sp>
-        <p:nvSpPr>
-          <p:cNvPr id="7" name="Footer Placeholder 4"/>
-          <p:cNvSpPr>
-            <a:spLocks noGrp="1"/>
-          </p:cNvSpPr>
-          <p:nvPr>
-            <p:ph type="ftr" sz="quarter" idx="11"/>
-          </p:nvPr>
-        </p:nvSpPr>
-        <p:spPr>
-          <a:xfrm>
-            <a:off x="4038600" y="6356350"/>
-            <a:ext cx="4114800" cy="365125"/>
-          </a:xfrm>
-        </p:spPr>
-        <p:txBody>
-          <a:bodyPr/>
-          <a:lstStyle/>
-          <a:p>
-            <a:r>
-              <a:rPr lang="en-GB" smtClean="0"/>
-              <a:t>MJ2380-2381 2020</a:t>
-            </a:r>
-            <a:endParaRPr lang="en-GB" dirty="0"/>
-          </a:p>
-        </p:txBody>
-      </p:sp>
-    </p:spTree>
-    <p:extLst>
-      <p:ext uri="{BB962C8B-B14F-4D97-AF65-F5344CB8AC3E}">
-        <p14:creationId xmlns:p14="http://schemas.microsoft.com/office/powerpoint/2010/main" val="1208241015"/>
-      </p:ext>
-    </p:extLst>
-  </p:cSld>
-  <p:clrMapOvr>
-    <a:masterClrMapping/>
-  </p:clrMapOvr>
-  <mc:AlternateContent xmlns:mc="http://schemas.openxmlformats.org/markup-compatibility/2006" xmlns:p14="http://schemas.microsoft.com/office/powerpoint/2010/main">
-    <mc:Choice Requires="p14">
-      <p:transition spd="med" p14:dur="700">
-        <p:fade/>
-      </p:transition>
-    </mc:Choice>
-    <mc:Fallback xmlns="">
-      <p:transition spd="med">
-        <p:fade/>
-      </p:transition>
-    </mc:Fallback>
-  </mc:AlternateContent>
-  <p:timing>
-    <p:tnLst>
-      <p:par>
-        <p:cTn id="1" dur="indefinite" restart="never" nodeType="tmRoot"/>
-      </p:par>
-    </p:tnLst>
-  </p:timing>
-</p:sld>
-</file>
-
-<file path=ppt/slides/slide17.xml><?xml version="1.0" encoding="utf-8"?>
-<p:sld xmlns:a="http://schemas.openxmlformats.org/drawingml/2006/main" xmlns:r="http://schemas.openxmlformats.org/officeDocument/2006/relationships" xmlns:p="http://schemas.openxmlformats.org/presentationml/2006/main">
-  <p:cSld>
-    <p:spTree>
-      <p:nvGrpSpPr>
-        <p:cNvPr id="1" name=""/>
-        <p:cNvGrpSpPr/>
-        <p:nvPr/>
-      </p:nvGrpSpPr>
-      <p:grpSpPr>
-        <a:xfrm>
-          <a:off x="0" y="0"/>
-          <a:ext cx="0" cy="0"/>
-          <a:chOff x="0" y="0"/>
-          <a:chExt cx="0" cy="0"/>
-        </a:xfrm>
-      </p:grpSpPr>
-      <p:sp>
-        <p:nvSpPr>
           <p:cNvPr id="3" name="Title 2"/>
           <p:cNvSpPr>
             <a:spLocks noGrp="1"/>
@@ -19037,7 +18660,7 @@
                 </a:solidFill>
               </a:rPr>
               <a:pPr/>
-              <a:t>17</a:t>
+              <a:t>15</a:t>
             </a:fld>
             <a:endParaRPr lang="en-GB" sz="1400" dirty="0">
               <a:solidFill>
@@ -22925,7 +22548,7 @@
 </file>
 
 <file path=customXml/itemProps1.xml><?xml version="1.0" encoding="utf-8"?>
-<ds:datastoreItem xmlns:ds="http://schemas.openxmlformats.org/officeDocument/2006/customXml" ds:itemID="{C617D7A1-438A-4842-B3E3-9908A6EB6D2C}">
+<ds:datastoreItem xmlns:ds="http://schemas.openxmlformats.org/officeDocument/2006/customXml" ds:itemID="{C4C77668-3C09-4800-9078-32A63FDB8878}">
   <ds:schemaRefs>
     <ds:schemaRef ds:uri="http://schemas.microsoft.com/VisualStudio/2011/storyboarding/control"/>
   </ds:schemaRefs>
@@ -22933,7 +22556,7 @@
 </file>
 
 <file path=customXml/itemProps2.xml><?xml version="1.0" encoding="utf-8"?>
-<ds:datastoreItem xmlns:ds="http://schemas.openxmlformats.org/officeDocument/2006/customXml" ds:itemID="{C4C77668-3C09-4800-9078-32A63FDB8878}">
+<ds:datastoreItem xmlns:ds="http://schemas.openxmlformats.org/officeDocument/2006/customXml" ds:itemID="{C617D7A1-438A-4842-B3E3-9908A6EB6D2C}">
   <ds:schemaRefs>
     <ds:schemaRef ds:uri="http://schemas.microsoft.com/VisualStudio/2011/storyboarding/control"/>
   </ds:schemaRefs>
@@ -22949,7 +22572,7 @@
 </file>
 
 <file path=customXml/itemProps4.xml><?xml version="1.0" encoding="utf-8"?>
-<ds:datastoreItem xmlns:ds="http://schemas.openxmlformats.org/officeDocument/2006/customXml" ds:itemID="{1CFCFB3A-1124-4BB9-AF75-CF97631426FE}">
+<ds:datastoreItem xmlns:ds="http://schemas.openxmlformats.org/officeDocument/2006/customXml" ds:itemID="{834A27C6-F506-436C-BE80-EBD990020008}">
   <ds:schemaRefs>
     <ds:schemaRef ds:uri="http://schemas.microsoft.com/VisualStudio/2011/storyboarding/control"/>
   </ds:schemaRefs>
@@ -22957,7 +22580,7 @@
 </file>
 
 <file path=customXml/itemProps5.xml><?xml version="1.0" encoding="utf-8"?>
-<ds:datastoreItem xmlns:ds="http://schemas.openxmlformats.org/officeDocument/2006/customXml" ds:itemID="{834A27C6-F506-436C-BE80-EBD990020008}">
+<ds:datastoreItem xmlns:ds="http://schemas.openxmlformats.org/officeDocument/2006/customXml" ds:itemID="{1CFCFB3A-1124-4BB9-AF75-CF97631426FE}">
   <ds:schemaRefs>
     <ds:schemaRef ds:uri="http://schemas.microsoft.com/VisualStudio/2011/storyboarding/control"/>
   </ds:schemaRefs>

</xml_diff>